<commit_message>
Added more information to the poster
</commit_message>
<xml_diff>
--- a/poster-spot.pptx
+++ b/poster-spot.pptx
@@ -197,7 +197,7 @@
           <a:p>
             <a:fld id="{DDD160CA-63D9-3A4F-BA0D-7869D45E8980}" type="datetimeFigureOut">
               <a:rPr lang="en-US" smtClean="0"/>
-              <a:t>5/8/24</a:t>
+              <a:t>5/12/24</a:t>
             </a:fld>
             <a:endParaRPr lang="en-US"/>
           </a:p>
@@ -679,7 +679,7 @@
           <a:p>
             <a:fld id="{3916B671-5029-FE48-8C30-6F697E4FC88C}" type="datetimeFigureOut">
               <a:rPr lang="en-US" smtClean="0"/>
-              <a:t>5/8/24</a:t>
+              <a:t>5/12/24</a:t>
             </a:fld>
             <a:endParaRPr lang="en-US"/>
           </a:p>
@@ -849,7 +849,7 @@
           <a:p>
             <a:fld id="{3916B671-5029-FE48-8C30-6F697E4FC88C}" type="datetimeFigureOut">
               <a:rPr lang="en-US" smtClean="0"/>
-              <a:t>5/8/24</a:t>
+              <a:t>5/12/24</a:t>
             </a:fld>
             <a:endParaRPr lang="en-US"/>
           </a:p>
@@ -1029,7 +1029,7 @@
           <a:p>
             <a:fld id="{3916B671-5029-FE48-8C30-6F697E4FC88C}" type="datetimeFigureOut">
               <a:rPr lang="en-US" smtClean="0"/>
-              <a:t>5/8/24</a:t>
+              <a:t>5/12/24</a:t>
             </a:fld>
             <a:endParaRPr lang="en-US"/>
           </a:p>
@@ -1199,7 +1199,7 @@
           <a:p>
             <a:fld id="{3916B671-5029-FE48-8C30-6F697E4FC88C}" type="datetimeFigureOut">
               <a:rPr lang="en-US" smtClean="0"/>
-              <a:t>5/8/24</a:t>
+              <a:t>5/12/24</a:t>
             </a:fld>
             <a:endParaRPr lang="en-US"/>
           </a:p>
@@ -1443,7 +1443,7 @@
           <a:p>
             <a:fld id="{3916B671-5029-FE48-8C30-6F697E4FC88C}" type="datetimeFigureOut">
               <a:rPr lang="en-US" smtClean="0"/>
-              <a:t>5/8/24</a:t>
+              <a:t>5/12/24</a:t>
             </a:fld>
             <a:endParaRPr lang="en-US"/>
           </a:p>
@@ -1675,7 +1675,7 @@
           <a:p>
             <a:fld id="{3916B671-5029-FE48-8C30-6F697E4FC88C}" type="datetimeFigureOut">
               <a:rPr lang="en-US" smtClean="0"/>
-              <a:t>5/8/24</a:t>
+              <a:t>5/12/24</a:t>
             </a:fld>
             <a:endParaRPr lang="en-US"/>
           </a:p>
@@ -2042,7 +2042,7 @@
           <a:p>
             <a:fld id="{3916B671-5029-FE48-8C30-6F697E4FC88C}" type="datetimeFigureOut">
               <a:rPr lang="en-US" smtClean="0"/>
-              <a:t>5/8/24</a:t>
+              <a:t>5/12/24</a:t>
             </a:fld>
             <a:endParaRPr lang="en-US"/>
           </a:p>
@@ -2160,7 +2160,7 @@
           <a:p>
             <a:fld id="{3916B671-5029-FE48-8C30-6F697E4FC88C}" type="datetimeFigureOut">
               <a:rPr lang="en-US" smtClean="0"/>
-              <a:t>5/8/24</a:t>
+              <a:t>5/12/24</a:t>
             </a:fld>
             <a:endParaRPr lang="en-US"/>
           </a:p>
@@ -2255,7 +2255,7 @@
           <a:p>
             <a:fld id="{3916B671-5029-FE48-8C30-6F697E4FC88C}" type="datetimeFigureOut">
               <a:rPr lang="en-US" smtClean="0"/>
-              <a:t>5/8/24</a:t>
+              <a:t>5/12/24</a:t>
             </a:fld>
             <a:endParaRPr lang="en-US"/>
           </a:p>
@@ -2532,7 +2532,7 @@
           <a:p>
             <a:fld id="{3916B671-5029-FE48-8C30-6F697E4FC88C}" type="datetimeFigureOut">
               <a:rPr lang="en-US" smtClean="0"/>
-              <a:t>5/8/24</a:t>
+              <a:t>5/12/24</a:t>
             </a:fld>
             <a:endParaRPr lang="en-US"/>
           </a:p>
@@ -2789,7 +2789,7 @@
           <a:p>
             <a:fld id="{3916B671-5029-FE48-8C30-6F697E4FC88C}" type="datetimeFigureOut">
               <a:rPr lang="en-US" smtClean="0"/>
-              <a:t>5/8/24</a:t>
+              <a:t>5/12/24</a:t>
             </a:fld>
             <a:endParaRPr lang="en-US"/>
           </a:p>
@@ -3002,7 +3002,7 @@
           <a:p>
             <a:fld id="{3916B671-5029-FE48-8C30-6F697E4FC88C}" type="datetimeFigureOut">
               <a:rPr lang="en-US" smtClean="0"/>
-              <a:t>5/8/24</a:t>
+              <a:t>5/12/24</a:t>
             </a:fld>
             <a:endParaRPr lang="en-US"/>
           </a:p>
@@ -3690,17 +3690,27 @@
           <a:bodyPr rtlCol="0" anchor="ctr"/>
           <a:lstStyle/>
           <a:p>
-            <a:pPr algn="ctr"/>
-            <a:r>
-              <a:rPr lang="en-US" sz="4000" dirty="0">
+            <a:pPr algn="just"/>
+            <a:r>
+              <a:rPr lang="en-US" sz="5400" b="0" i="0" dirty="0">
                 <a:solidFill>
                   <a:schemeClr val="tx1"/>
                 </a:solidFill>
+                <a:effectLst/>
+                <a:highlight>
+                  <a:srgbClr val="FFFFFF"/>
+                </a:highlight>
                 <a:latin typeface="Calibri" panose="020F0502020204030204" pitchFamily="34" charset="0"/>
-                <a:cs typeface="Calibri" panose="020F0502020204030204" pitchFamily="34" charset="0"/>
               </a:rPr>
-              <a:t>The abstract is a summary of the research question or hypothesis, the methods, the data, and the conclusions described in the other sections of the poster.</a:t>
-            </a:r>
+              <a:t>We have a skills shortage in construction, particularly among non-English speaking labor. Our objective is to realize inclusive and user-friendly learning using AR/VR using Unity and robotic dog cameras. It will need a clear yet professional approach to empower employees and enhance workforce capacities in order to resolve this problem. </a:t>
+            </a:r>
+            <a:endParaRPr lang="en-US" sz="9600" dirty="0">
+              <a:solidFill>
+                <a:schemeClr val="tx1"/>
+              </a:solidFill>
+              <a:latin typeface="Calibri" panose="020F0502020204030204" pitchFamily="34" charset="0"/>
+              <a:cs typeface="Calibri" panose="020F0502020204030204" pitchFamily="34" charset="0"/>
+            </a:endParaRPr>
           </a:p>
         </p:txBody>
       </p:sp>
@@ -3806,16 +3816,18 @@
           <a:bodyPr rtlCol="0" anchor="ctr"/>
           <a:lstStyle/>
           <a:p>
-            <a:pPr algn="ctr"/>
-            <a:r>
-              <a:rPr lang="en-US" sz="4000" dirty="0">
+            <a:pPr algn="just"/>
+            <a:r>
+              <a:rPr lang="en-US" sz="3600" dirty="0">
                 <a:solidFill>
                   <a:schemeClr val="tx1"/>
                 </a:solidFill>
+                <a:highlight>
+                  <a:srgbClr val="FFFFFF"/>
+                </a:highlight>
                 <a:latin typeface="Calibri" panose="020F0502020204030204" pitchFamily="34" charset="0"/>
-                <a:cs typeface="Calibri" panose="020F0502020204030204" pitchFamily="34" charset="0"/>
               </a:rPr>
-              <a:t>Define how you conducted research</a:t>
+              <a:t>In my research, I delved into practical implementation within Unity, with a specific focus on simulating the movement and behavior of the Spot robot. I started by studying the mechanics of the Spot robot's movements and behaviors, learning how to replicate them realistically within the Unity environment. This involved experimenting with Unity's animation and physics systems to create lifelike simulations of the robot's actions. Through iterative testing and refinement, my aim was to develop a virtual representation of the Spot robot(Figure 1)  that accurately mirrored its real-world capabilities.</a:t>
             </a:r>
           </a:p>
         </p:txBody>
@@ -3922,16 +3934,18 @@
           <a:bodyPr rtlCol="0" anchor="ctr"/>
           <a:lstStyle/>
           <a:p>
-            <a:pPr algn="ctr"/>
+            <a:pPr algn="just"/>
             <a:r>
               <a:rPr lang="en-US" sz="4000" dirty="0">
                 <a:solidFill>
                   <a:schemeClr val="tx1"/>
                 </a:solidFill>
+                <a:highlight>
+                  <a:srgbClr val="FFFFFF"/>
+                </a:highlight>
                 <a:latin typeface="Calibri" panose="020F0502020204030204" pitchFamily="34" charset="0"/>
-                <a:cs typeface="Calibri" panose="020F0502020204030204" pitchFamily="34" charset="0"/>
               </a:rPr>
-              <a:t>Problem Statement / Research Question / Hypothesis / Motivation</a:t>
+              <a:t>We hypothesize that by implementing an immersive learning experience through AR/VR simulations controlled via Unity software and robotic dog cameras, we can effectively empower employees within the construction industry, irrespective of language barriers, thereby enhancing workforce capacities and addressing the prevailing skills shortage.</a:t>
             </a:r>
           </a:p>
         </p:txBody>
@@ -4093,16 +4107,18 @@
           <a:bodyPr rtlCol="0" anchor="ctr"/>
           <a:lstStyle/>
           <a:p>
-            <a:pPr algn="ctr"/>
-            <a:r>
-              <a:rPr lang="en-US" sz="4000" dirty="0">
+            <a:pPr algn="just"/>
+            <a:r>
+              <a:rPr lang="en-US" sz="3200" dirty="0">
                 <a:solidFill>
                   <a:schemeClr val="tx1"/>
                 </a:solidFill>
+                <a:highlight>
+                  <a:srgbClr val="FFFFFF"/>
+                </a:highlight>
                 <a:latin typeface="Calibri" panose="020F0502020204030204" pitchFamily="34" charset="0"/>
-                <a:cs typeface="Calibri" panose="020F0502020204030204" pitchFamily="34" charset="0"/>
               </a:rPr>
-              <a:t>What is your contribution</a:t>
+              <a:t>I successfully created a VR simulation of the Spot robot, allowing me to control its movements and interact with its environment in a virtual setting. This simulation provides an immersive experience, enabling people to familiarize  with the operation of the robot in a safe and controlled environment. Additionally, to accommodate users without access to VR hardware such as the Quest 3, I integrated a keyboard-compatible version of the simulation. This alternative version allows users to experience controlling the robot using standard keyboard inputs, providing a similar feel and functionality as the VR environment.</a:t>
             </a:r>
           </a:p>
         </p:txBody>
@@ -4209,16 +4225,18 @@
           <a:bodyPr rtlCol="0" anchor="ctr"/>
           <a:lstStyle/>
           <a:p>
-            <a:pPr algn="ctr"/>
-            <a:r>
-              <a:rPr lang="en-US" sz="4000" dirty="0">
+            <a:pPr algn="just"/>
+            <a:r>
+              <a:rPr lang="en-US" sz="3600" dirty="0">
                 <a:solidFill>
                   <a:schemeClr val="tx1"/>
                 </a:solidFill>
+                <a:highlight>
+                  <a:srgbClr val="FFFFFF"/>
+                </a:highlight>
                 <a:latin typeface="Calibri" panose="020F0502020204030204" pitchFamily="34" charset="0"/>
-                <a:cs typeface="Calibri" panose="020F0502020204030204" pitchFamily="34" charset="0"/>
               </a:rPr>
-              <a:t>What related work remains</a:t>
+              <a:t>In future iterations, if I have additional time, I would love to expand the capabilities of the simulation. One exciting feature I'd like to add is the ability for users to import their own assets and create custom virtual environments directly within the VR interface, rather than solely relying on Unity's editor. This enhancement would provide users with greater creative control, allowing them to tailor the simulation to their specific needs and preferences.</a:t>
             </a:r>
           </a:p>
         </p:txBody>
@@ -4325,16 +4343,18 @@
           <a:bodyPr rtlCol="0" anchor="ctr"/>
           <a:lstStyle/>
           <a:p>
-            <a:pPr algn="ctr"/>
-            <a:r>
-              <a:rPr lang="en-US" sz="4000" dirty="0">
+            <a:pPr algn="just"/>
+            <a:r>
+              <a:rPr lang="en-US" sz="3200" dirty="0">
                 <a:solidFill>
                   <a:schemeClr val="tx1"/>
                 </a:solidFill>
+                <a:highlight>
+                  <a:srgbClr val="FFFFFF"/>
+                </a:highlight>
                 <a:latin typeface="Calibri" panose="020F0502020204030204" pitchFamily="34" charset="0"/>
-                <a:cs typeface="Calibri" panose="020F0502020204030204" pitchFamily="34" charset="0"/>
               </a:rPr>
-              <a:t>What should readers know to understand your research</a:t>
+              <a:t>The construction industry faces a persistent skills shortage, exacerbated by communication barriers among non-English speaking laborers. Traditional training methods struggle to adequately address these challenges, prompting interest in innovative solutions. Augmented reality (AR) and virtual reality (VR) technologies, along with platforms like Unity, offer promising avenues for immersive, language-independent training experiences. Additionally, advancements in robotics, such as Boston Dynamics' Spot robot, present new opportunities for enhancing training effectiveness. This project aims to leverage AR/VR technology and Unity software to develop a user-friendly learning platform tailored to the needs of non-English speaking construction workers.</a:t>
             </a:r>
           </a:p>
         </p:txBody>
@@ -4827,7 +4847,7 @@
                 <a:latin typeface="Calibri" panose="020F0502020204030204" pitchFamily="34" charset="0"/>
                 <a:cs typeface="Calibri" panose="020F0502020204030204" pitchFamily="34" charset="0"/>
               </a:rPr>
-              <a:t>: This is the description of the figure</a:t>
+              <a:t>:  Photograph of the Spot robot by Boston Dynamics</a:t>
             </a:r>
           </a:p>
         </p:txBody>

</xml_diff>